<commit_message>
Change disadvantage to advantage and vice versa
</commit_message>
<xml_diff>
--- a/content-based.pptx
+++ b/content-based.pptx
@@ -6,10 +6,13 @@
   </p:sldMasterIdLst>
   <p:sldIdLst>
     <p:sldId id="256" r:id="rId2"/>
-    <p:sldId id="260" r:id="rId3"/>
-    <p:sldId id="259" r:id="rId4"/>
-    <p:sldId id="261" r:id="rId5"/>
-    <p:sldId id="262" r:id="rId6"/>
+    <p:sldId id="263" r:id="rId3"/>
+    <p:sldId id="260" r:id="rId4"/>
+    <p:sldId id="259" r:id="rId5"/>
+    <p:sldId id="261" r:id="rId6"/>
+    <p:sldId id="262" r:id="rId7"/>
+    <p:sldId id="265" r:id="rId8"/>
+    <p:sldId id="264" r:id="rId9"/>
   </p:sldIdLst>
   <p:sldSz cx="9144000" cy="6858000" type="screen4x3"/>
   <p:notesSz cx="6858000" cy="9144000"/>
@@ -3180,6 +3183,242 @@
 </file>
 
 <file path=ppt/slides/slide2.xml><?xml version="1.0" encoding="utf-8"?>
+<p:sld xmlns:a="http://schemas.openxmlformats.org/drawingml/2006/main" xmlns:r="http://schemas.openxmlformats.org/officeDocument/2006/relationships" xmlns:mc="http://schemas.openxmlformats.org/markup-compatibility/2006" xmlns:mv="urn:schemas-microsoft-com:mac:vml" xmlns:p="http://schemas.openxmlformats.org/presentationml/2006/main" mc:Ignorable="mv" mc:PreserveAttributes="mv:*">
+  <p:cSld>
+    <p:spTree>
+      <p:nvGrpSpPr>
+        <p:cNvPr id="1" name=""/>
+        <p:cNvGrpSpPr/>
+        <p:nvPr/>
+      </p:nvGrpSpPr>
+      <p:grpSpPr>
+        <a:xfrm>
+          <a:off x="0" y="0"/>
+          <a:ext cx="0" cy="0"/>
+          <a:chOff x="0" y="0"/>
+          <a:chExt cx="0" cy="0"/>
+        </a:xfrm>
+      </p:grpSpPr>
+      <p:sp>
+        <p:nvSpPr>
+          <p:cNvPr id="2" name="Title 1"/>
+          <p:cNvSpPr>
+            <a:spLocks noGrp="1"/>
+          </p:cNvSpPr>
+          <p:nvPr>
+            <p:ph type="title"/>
+          </p:nvPr>
+        </p:nvSpPr>
+        <p:spPr/>
+        <p:txBody>
+          <a:bodyPr/>
+          <a:lstStyle/>
+          <a:p>
+            <a:pPr algn="l"/>
+            <a:r>
+              <a:rPr lang="en-US" dirty="0" smtClean="0">
+                <a:latin typeface="Arial"/>
+                <a:cs typeface="Arial"/>
+              </a:rPr>
+              <a:t>How does it work?</a:t>
+            </a:r>
+            <a:endParaRPr lang="en-US" dirty="0">
+              <a:latin typeface="Arial"/>
+              <a:cs typeface="Arial"/>
+            </a:endParaRPr>
+          </a:p>
+        </p:txBody>
+      </p:sp>
+      <p:sp>
+        <p:nvSpPr>
+          <p:cNvPr id="3" name="Content Placeholder 2"/>
+          <p:cNvSpPr>
+            <a:spLocks noGrp="1"/>
+          </p:cNvSpPr>
+          <p:nvPr>
+            <p:ph idx="1"/>
+          </p:nvPr>
+        </p:nvSpPr>
+        <p:spPr/>
+        <p:txBody>
+          <a:bodyPr>
+            <a:normAutofit/>
+          </a:bodyPr>
+          <a:lstStyle/>
+          <a:p>
+            <a:pPr>
+              <a:buNone/>
+            </a:pPr>
+            <a:endParaRPr lang="en-US" dirty="0" smtClean="0">
+              <a:latin typeface="Arial"/>
+              <a:cs typeface="Arial"/>
+            </a:endParaRPr>
+          </a:p>
+          <a:p>
+            <a:pPr>
+              <a:buNone/>
+            </a:pPr>
+            <a:endParaRPr lang="en-US" dirty="0" smtClean="0">
+              <a:latin typeface="Arial"/>
+              <a:cs typeface="Arial"/>
+            </a:endParaRPr>
+          </a:p>
+          <a:p>
+            <a:pPr>
+              <a:buNone/>
+            </a:pPr>
+            <a:endParaRPr lang="en-US" dirty="0" smtClean="0">
+              <a:latin typeface="Arial"/>
+              <a:cs typeface="Arial"/>
+            </a:endParaRPr>
+          </a:p>
+          <a:p>
+            <a:pPr>
+              <a:buNone/>
+            </a:pPr>
+            <a:endParaRPr lang="en-US" dirty="0" smtClean="0">
+              <a:latin typeface="Arial"/>
+              <a:cs typeface="Arial"/>
+            </a:endParaRPr>
+          </a:p>
+          <a:p>
+            <a:pPr>
+              <a:buNone/>
+            </a:pPr>
+            <a:endParaRPr lang="en-US" dirty="0" smtClean="0">
+              <a:latin typeface="Arial"/>
+              <a:cs typeface="Arial"/>
+            </a:endParaRPr>
+          </a:p>
+          <a:p>
+            <a:pPr>
+              <a:buNone/>
+            </a:pPr>
+            <a:endParaRPr lang="en-US" dirty="0" smtClean="0">
+              <a:latin typeface="Arial"/>
+              <a:cs typeface="Arial"/>
+            </a:endParaRPr>
+          </a:p>
+          <a:p>
+            <a:pPr>
+              <a:buNone/>
+            </a:pPr>
+            <a:r>
+              <a:rPr lang="en-US" dirty="0" smtClean="0">
+                <a:latin typeface="Arial"/>
+                <a:cs typeface="Arial"/>
+              </a:rPr>
+              <a:t>		     </a:t>
+            </a:r>
+          </a:p>
+        </p:txBody>
+      </p:sp>
+      <p:cxnSp>
+        <p:nvCxnSpPr>
+          <p:cNvPr id="6" name="Straight Connector 5"/>
+          <p:cNvCxnSpPr/>
+          <p:nvPr/>
+        </p:nvCxnSpPr>
+        <p:spPr>
+          <a:xfrm>
+            <a:off x="457200" y="1219200"/>
+            <a:ext cx="8458200" cy="1588"/>
+          </a:xfrm>
+          <a:prstGeom prst="line">
+            <a:avLst/>
+          </a:prstGeom>
+        </p:spPr>
+        <p:style>
+          <a:lnRef idx="2">
+            <a:schemeClr val="accent1"/>
+          </a:lnRef>
+          <a:fillRef idx="0">
+            <a:schemeClr val="accent1"/>
+          </a:fillRef>
+          <a:effectRef idx="1">
+            <a:schemeClr val="accent1"/>
+          </a:effectRef>
+          <a:fontRef idx="minor">
+            <a:schemeClr val="tx1"/>
+          </a:fontRef>
+        </p:style>
+      </p:cxnSp>
+      <p:pic>
+        <p:nvPicPr>
+          <p:cNvPr id="13" name="Picture 12"/>
+          <p:cNvPicPr>
+            <a:picLocks noChangeAspect="1"/>
+          </p:cNvPicPr>
+          <p:nvPr/>
+        </p:nvPicPr>
+        <p:blipFill>
+          <a:blip r:embed="rId2"/>
+          <a:stretch>
+            <a:fillRect/>
+          </a:stretch>
+        </p:blipFill>
+        <p:spPr>
+          <a:xfrm>
+            <a:off x="1371600" y="1729151"/>
+            <a:ext cx="6419850" cy="4397012"/>
+          </a:xfrm>
+          <a:prstGeom prst="rect">
+            <a:avLst/>
+          </a:prstGeom>
+        </p:spPr>
+      </p:pic>
+      <p:sp>
+        <p:nvSpPr>
+          <p:cNvPr id="14" name="TextBox 13"/>
+          <p:cNvSpPr txBox="1"/>
+          <p:nvPr/>
+        </p:nvSpPr>
+        <p:spPr>
+          <a:xfrm>
+            <a:off x="457200" y="6324600"/>
+            <a:ext cx="8229600" cy="400110"/>
+          </a:xfrm>
+          <a:prstGeom prst="rect">
+            <a:avLst/>
+          </a:prstGeom>
+          <a:noFill/>
+        </p:spPr>
+        <p:txBody>
+          <a:bodyPr wrap="square" rtlCol="0">
+            <a:spAutoFit/>
+          </a:bodyPr>
+          <a:lstStyle/>
+          <a:p>
+            <a:r>
+              <a:rPr lang="en-US" sz="1000" dirty="0" smtClean="0">
+                <a:latin typeface="Arial"/>
+                <a:cs typeface="Arial"/>
+              </a:rPr>
+              <a:t>Mining of Massive Datasets (https://lagunita.stanford.edu/asset-v1:ComputerScience+MMDS+SelfPaced+type@asset+block@RecommenderSystems2_ContentBased.pdf)</a:t>
+            </a:r>
+            <a:endParaRPr lang="en-US" sz="1000" dirty="0">
+              <a:latin typeface="Arial"/>
+              <a:cs typeface="Arial"/>
+            </a:endParaRPr>
+          </a:p>
+        </p:txBody>
+      </p:sp>
+    </p:spTree>
+  </p:cSld>
+  <p:clrMapOvr>
+    <a:masterClrMapping/>
+  </p:clrMapOvr>
+  <p:timing>
+    <p:tnLst>
+      <p:par>
+        <p:cTn id="1" dur="indefinite" restart="never" nodeType="tmRoot"/>
+      </p:par>
+    </p:tnLst>
+  </p:timing>
+</p:sld>
+</file>
+
+<file path=ppt/slides/slide3.xml><?xml version="1.0" encoding="utf-8"?>
 <p:sld xmlns:a="http://schemas.openxmlformats.org/drawingml/2006/main" xmlns:r="http://schemas.openxmlformats.org/officeDocument/2006/relationships" xmlns:mc="http://schemas.openxmlformats.org/markup-compatibility/2006" xmlns:mv="urn:schemas-microsoft-com:mac:vml" xmlns:p="http://schemas.openxmlformats.org/presentationml/2006/main" mc:Ignorable="mv" mc:PreserveAttributes="mv:*">
   <p:cSld>
     <p:spTree>
@@ -4047,7 +4286,7 @@
 </p:sld>
 </file>
 
-<file path=ppt/slides/slide3.xml><?xml version="1.0" encoding="utf-8"?>
+<file path=ppt/slides/slide4.xml><?xml version="1.0" encoding="utf-8"?>
 <p:sld xmlns:a="http://schemas.openxmlformats.org/drawingml/2006/main" xmlns:r="http://schemas.openxmlformats.org/officeDocument/2006/relationships" xmlns:mc="http://schemas.openxmlformats.org/markup-compatibility/2006" xmlns:mv="urn:schemas-microsoft-com:mac:vml" xmlns:p="http://schemas.openxmlformats.org/presentationml/2006/main" mc:Ignorable="mv" mc:PreserveAttributes="mv:*">
   <p:cSld>
     <p:spTree>
@@ -4147,7 +4386,7 @@
         <p:spPr/>
         <p:txBody>
           <a:bodyPr>
-            <a:normAutofit fontScale="70000" lnSpcReduction="20000"/>
+            <a:normAutofit fontScale="47500" lnSpcReduction="20000"/>
           </a:bodyPr>
           <a:lstStyle/>
           <a:p>
@@ -4205,13 +4444,10 @@
             <a:pPr>
               <a:buNone/>
             </a:pPr>
-            <a:r>
-              <a:rPr lang="en-US" dirty="0" smtClean="0">
-                <a:latin typeface="Arial"/>
-                <a:cs typeface="Arial"/>
-              </a:rPr>
-              <a:t>Features – same features used in the item-feature matrix</a:t>
-            </a:r>
+            <a:endParaRPr lang="en-US" dirty="0" smtClean="0">
+              <a:latin typeface="Arial"/>
+              <a:cs typeface="Arial"/>
+            </a:endParaRPr>
           </a:p>
           <a:p>
             <a:pPr>
@@ -4226,12 +4462,21 @@
             <a:pPr>
               <a:buNone/>
             </a:pPr>
+            <a:endParaRPr lang="en-US" dirty="0" smtClean="0">
+              <a:latin typeface="Arial"/>
+              <a:cs typeface="Arial"/>
+            </a:endParaRPr>
+          </a:p>
+          <a:p>
+            <a:pPr>
+              <a:buNone/>
+            </a:pPr>
             <a:r>
               <a:rPr lang="en-US" dirty="0" smtClean="0">
                 <a:latin typeface="Arial"/>
                 <a:cs typeface="Arial"/>
               </a:rPr>
-              <a:t>Values – again depend on the feature data type</a:t>
+              <a:t>Features – same features used in the item-feature matrix</a:t>
             </a:r>
           </a:p>
           <a:p>
@@ -4247,10 +4492,13 @@
             <a:pPr>
               <a:buNone/>
             </a:pPr>
-            <a:endParaRPr lang="en-US" dirty="0" smtClean="0">
-              <a:latin typeface="Arial"/>
-              <a:cs typeface="Arial"/>
-            </a:endParaRPr>
+            <a:r>
+              <a:rPr lang="en-US" dirty="0" smtClean="0">
+                <a:latin typeface="Arial"/>
+                <a:cs typeface="Arial"/>
+              </a:rPr>
+              <a:t>Values – again depend on the feature data type</a:t>
+            </a:r>
           </a:p>
           <a:p>
             <a:pPr>
@@ -4265,6 +4513,54 @@
             <a:pPr>
               <a:buNone/>
             </a:pPr>
+            <a:r>
+              <a:rPr lang="en-US" dirty="0" smtClean="0">
+                <a:latin typeface="Arial"/>
+                <a:cs typeface="Arial"/>
+              </a:rPr>
+              <a:t>How to obtain this data?</a:t>
+            </a:r>
+          </a:p>
+          <a:p>
+            <a:pPr>
+              <a:buNone/>
+            </a:pPr>
+            <a:r>
+              <a:rPr lang="en-US" dirty="0" smtClean="0">
+                <a:latin typeface="Arial"/>
+                <a:cs typeface="Arial"/>
+              </a:rPr>
+              <a:t>  An example:</a:t>
+            </a:r>
+          </a:p>
+          <a:p>
+            <a:pPr>
+              <a:buNone/>
+            </a:pPr>
+            <a:r>
+              <a:rPr lang="en-US" dirty="0" smtClean="0">
+                <a:latin typeface="Arial"/>
+                <a:cs typeface="Arial"/>
+              </a:rPr>
+              <a:t>	</a:t>
+            </a:r>
+          </a:p>
+          <a:p>
+            <a:pPr>
+              <a:buNone/>
+            </a:pPr>
+            <a:r>
+              <a:rPr lang="en-US" dirty="0" smtClean="0">
+                <a:latin typeface="Arial"/>
+                <a:cs typeface="Arial"/>
+              </a:rPr>
+              <a:t>	Suppose user watched 5 movies, 2 of which with actor A and 3 of which with actor B.</a:t>
+            </a:r>
+          </a:p>
+          <a:p>
+            <a:pPr>
+              <a:buNone/>
+            </a:pPr>
             <a:endParaRPr lang="en-US" dirty="0" smtClean="0">
               <a:latin typeface="Arial"/>
               <a:cs typeface="Arial"/>
@@ -4279,7 +4575,26 @@
                 <a:latin typeface="Arial"/>
                 <a:cs typeface="Arial"/>
               </a:rPr>
-              <a:t>		     </a:t>
+              <a:t>	Feature A’s weight = 2/5 = 0.4</a:t>
+            </a:r>
+          </a:p>
+          <a:p>
+            <a:pPr>
+              <a:buNone/>
+            </a:pPr>
+            <a:r>
+              <a:rPr lang="en-US" dirty="0">
+                <a:latin typeface="Arial"/>
+                <a:cs typeface="Arial"/>
+              </a:rPr>
+              <a:t>	</a:t>
+            </a:r>
+            <a:r>
+              <a:rPr lang="en-US" dirty="0" smtClean="0">
+                <a:latin typeface="Arial"/>
+                <a:cs typeface="Arial"/>
+              </a:rPr>
+              <a:t>Feature B’s weight = 3/5 = 0.6 </a:t>
             </a:r>
           </a:p>
         </p:txBody>
@@ -4674,7 +4989,7 @@
 </p:sld>
 </file>
 
-<file path=ppt/slides/slide4.xml><?xml version="1.0" encoding="utf-8"?>
+<file path=ppt/slides/slide5.xml><?xml version="1.0" encoding="utf-8"?>
 <p:sld xmlns:a="http://schemas.openxmlformats.org/drawingml/2006/main" xmlns:r="http://schemas.openxmlformats.org/officeDocument/2006/relationships" xmlns:mc="http://schemas.openxmlformats.org/markup-compatibility/2006" xmlns:mv="urn:schemas-microsoft-com:mac:vml" xmlns:p="http://schemas.openxmlformats.org/presentationml/2006/main" mc:Ignorable="mv" mc:PreserveAttributes="mv:*">
   <p:cSld>
     <p:spTree>
@@ -5453,10 +5768,17 @@
   <p:clrMapOvr>
     <a:masterClrMapping/>
   </p:clrMapOvr>
+  <p:timing>
+    <p:tnLst>
+      <p:par>
+        <p:cTn id="1" dur="indefinite" restart="never" nodeType="tmRoot"/>
+      </p:par>
+    </p:tnLst>
+  </p:timing>
 </p:sld>
 </file>
 
-<file path=ppt/slides/slide5.xml><?xml version="1.0" encoding="utf-8"?>
+<file path=ppt/slides/slide6.xml><?xml version="1.0" encoding="utf-8"?>
 <p:sld xmlns:a="http://schemas.openxmlformats.org/drawingml/2006/main" xmlns:r="http://schemas.openxmlformats.org/officeDocument/2006/relationships" xmlns:mc="http://schemas.openxmlformats.org/markup-compatibility/2006" xmlns:mv="urn:schemas-microsoft-com:mac:vml" xmlns:p="http://schemas.openxmlformats.org/presentationml/2006/main" mc:Ignorable="mv" mc:PreserveAttributes="mv:*">
   <p:cSld>
     <p:spTree>
@@ -5529,22 +5851,24 @@
         <p:spPr/>
         <p:txBody>
           <a:bodyPr>
-            <a:normAutofit/>
+            <a:normAutofit fontScale="85000" lnSpcReduction="20000"/>
           </a:bodyPr>
           <a:lstStyle/>
           <a:p>
             <a:pPr>
               <a:buNone/>
             </a:pPr>
-            <a:endParaRPr lang="en-US" smtClean="0">
-              <a:latin typeface="Arial"/>
-              <a:cs typeface="Arial"/>
-            </a:endParaRPr>
+            <a:r>
+              <a:rPr lang="en-US" dirty="0" smtClean="0">
+                <a:latin typeface="Arial"/>
+                <a:cs typeface="Arial"/>
+              </a:rPr>
+              <a:t>(between user and item vectors)</a:t>
+            </a:r>
           </a:p>
           <a:p>
             <a:pPr>
-              <a:buFontTx/>
-              <a:buChar char="-"/>
+              <a:buNone/>
             </a:pPr>
             <a:endParaRPr lang="en-US" dirty="0" smtClean="0">
               <a:latin typeface="Arial"/>
@@ -5552,9 +5876,38 @@
             </a:endParaRPr>
           </a:p>
           <a:p>
+            <a:pPr marL="514350" indent="-514350">
+              <a:buNone/>
+            </a:pPr>
+            <a:r>
+              <a:rPr lang="en-US" dirty="0" smtClean="0">
+                <a:latin typeface="Arial"/>
+                <a:cs typeface="Arial"/>
+              </a:rPr>
+              <a:t>Cosine similarity</a:t>
+            </a:r>
+          </a:p>
+          <a:p>
             <a:pPr>
-              <a:buFontTx/>
-              <a:buChar char="-"/>
+              <a:buNone/>
+            </a:pPr>
+            <a:endParaRPr lang="en-US" dirty="0" smtClean="0">
+              <a:latin typeface="Arial"/>
+              <a:cs typeface="Arial"/>
+            </a:endParaRPr>
+          </a:p>
+          <a:p>
+            <a:pPr>
+              <a:buNone/>
+            </a:pPr>
+            <a:endParaRPr lang="en-US" dirty="0" smtClean="0">
+              <a:latin typeface="Arial"/>
+              <a:cs typeface="Arial"/>
+            </a:endParaRPr>
+          </a:p>
+          <a:p>
+            <a:pPr>
+              <a:buNone/>
             </a:pPr>
             <a:endParaRPr lang="en-US" dirty="0" smtClean="0">
               <a:latin typeface="Arial"/>
@@ -5632,11 +5985,806 @@
           </a:fontRef>
         </p:style>
       </p:cxnSp>
+      <p:sp>
+        <p:nvSpPr>
+          <p:cNvPr id="7" name="TextBox 6"/>
+          <p:cNvSpPr txBox="1"/>
+          <p:nvPr/>
+        </p:nvSpPr>
+        <p:spPr>
+          <a:xfrm>
+            <a:off x="3048000" y="5029200"/>
+            <a:ext cx="2895600" cy="369332"/>
+          </a:xfrm>
+          <a:prstGeom prst="rect">
+            <a:avLst/>
+          </a:prstGeom>
+          <a:noFill/>
+        </p:spPr>
+        <p:txBody>
+          <a:bodyPr wrap="square" rtlCol="0">
+            <a:spAutoFit/>
+          </a:bodyPr>
+          <a:lstStyle/>
+          <a:p>
+            <a:r>
+              <a:rPr lang="en-US" dirty="0" err="1" smtClean="0">
+                <a:latin typeface="Arial"/>
+                <a:cs typeface="Arial"/>
+              </a:rPr>
+              <a:t>cos</a:t>
+            </a:r>
+            <a:r>
+              <a:rPr lang="en-US" dirty="0" smtClean="0">
+                <a:latin typeface="Arial"/>
+                <a:cs typeface="Arial"/>
+              </a:rPr>
+              <a:t> </a:t>
+            </a:r>
+            <a:r>
+              <a:rPr lang="en-US" dirty="0" err="1" smtClean="0">
+                <a:latin typeface="Arial"/>
+                <a:cs typeface="Arial"/>
+              </a:rPr>
+              <a:t>Θ</a:t>
+            </a:r>
+            <a:r>
+              <a:rPr lang="en-US" dirty="0" smtClean="0">
+                <a:latin typeface="Arial"/>
+                <a:cs typeface="Arial"/>
+              </a:rPr>
+              <a:t> = </a:t>
+            </a:r>
+            <a:r>
+              <a:rPr lang="en-US" dirty="0" err="1" smtClean="0">
+                <a:latin typeface="Arial"/>
+                <a:cs typeface="Arial"/>
+              </a:rPr>
+              <a:t>x</a:t>
+            </a:r>
+            <a:r>
+              <a:rPr lang="en-US" dirty="0" smtClean="0">
+                <a:latin typeface="Arial"/>
+                <a:cs typeface="Arial"/>
+              </a:rPr>
+              <a:t> </a:t>
+            </a:r>
+            <a:r>
+              <a:rPr lang="en-US" dirty="0" err="1" smtClean="0">
+                <a:latin typeface="Wingdings"/>
+                <a:ea typeface="Wingdings"/>
+                <a:cs typeface="Wingdings"/>
+              </a:rPr>
+              <a:t></a:t>
+            </a:r>
+            <a:r>
+              <a:rPr lang="en-US" dirty="0" smtClean="0">
+                <a:latin typeface="Arial"/>
+                <a:cs typeface="Arial"/>
+              </a:rPr>
+              <a:t> </a:t>
+            </a:r>
+            <a:r>
+              <a:rPr lang="en-US" dirty="0" err="1" smtClean="0">
+                <a:latin typeface="Arial"/>
+                <a:cs typeface="Arial"/>
+              </a:rPr>
+              <a:t>i</a:t>
+            </a:r>
+            <a:r>
+              <a:rPr lang="en-US" dirty="0" smtClean="0">
+                <a:latin typeface="Arial"/>
+                <a:cs typeface="Arial"/>
+              </a:rPr>
+              <a:t>  ⁄  | </a:t>
+            </a:r>
+            <a:r>
+              <a:rPr lang="en-US" dirty="0" err="1" smtClean="0">
+                <a:latin typeface="Arial"/>
+                <a:cs typeface="Arial"/>
+              </a:rPr>
+              <a:t>x</a:t>
+            </a:r>
+            <a:r>
+              <a:rPr lang="en-US" dirty="0" smtClean="0">
+                <a:latin typeface="Arial"/>
+                <a:cs typeface="Arial"/>
+              </a:rPr>
+              <a:t> | | </a:t>
+            </a:r>
+            <a:r>
+              <a:rPr lang="en-US" dirty="0" err="1" smtClean="0">
+                <a:latin typeface="Arial"/>
+                <a:cs typeface="Arial"/>
+              </a:rPr>
+              <a:t>i</a:t>
+            </a:r>
+            <a:r>
+              <a:rPr lang="en-US" dirty="0" smtClean="0">
+                <a:latin typeface="Arial"/>
+                <a:cs typeface="Arial"/>
+              </a:rPr>
+              <a:t> |</a:t>
+            </a:r>
+            <a:endParaRPr lang="en-US" dirty="0">
+              <a:latin typeface="Arial"/>
+              <a:cs typeface="Arial"/>
+            </a:endParaRPr>
+          </a:p>
+        </p:txBody>
+      </p:sp>
+      <p:cxnSp>
+        <p:nvCxnSpPr>
+          <p:cNvPr id="10" name="Straight Arrow Connector 9"/>
+          <p:cNvCxnSpPr/>
+          <p:nvPr/>
+        </p:nvCxnSpPr>
+        <p:spPr>
+          <a:xfrm rot="5400000" flipH="1" flipV="1">
+            <a:off x="3048000" y="2971800"/>
+            <a:ext cx="1600200" cy="1600200"/>
+          </a:xfrm>
+          <a:prstGeom prst="straightConnector1">
+            <a:avLst/>
+          </a:prstGeom>
+          <a:ln>
+            <a:tailEnd type="arrow"/>
+          </a:ln>
+        </p:spPr>
+        <p:style>
+          <a:lnRef idx="2">
+            <a:schemeClr val="accent1"/>
+          </a:lnRef>
+          <a:fillRef idx="0">
+            <a:schemeClr val="accent1"/>
+          </a:fillRef>
+          <a:effectRef idx="1">
+            <a:schemeClr val="accent1"/>
+          </a:effectRef>
+          <a:fontRef idx="minor">
+            <a:schemeClr val="tx1"/>
+          </a:fontRef>
+        </p:style>
+      </p:cxnSp>
+      <p:cxnSp>
+        <p:nvCxnSpPr>
+          <p:cNvPr id="12" name="Straight Arrow Connector 11"/>
+          <p:cNvCxnSpPr/>
+          <p:nvPr/>
+        </p:nvCxnSpPr>
+        <p:spPr>
+          <a:xfrm flipV="1">
+            <a:off x="3048000" y="3733800"/>
+            <a:ext cx="2209800" cy="838200"/>
+          </a:xfrm>
+          <a:prstGeom prst="straightConnector1">
+            <a:avLst/>
+          </a:prstGeom>
+          <a:ln>
+            <a:tailEnd type="arrow"/>
+          </a:ln>
+        </p:spPr>
+        <p:style>
+          <a:lnRef idx="2">
+            <a:schemeClr val="accent2"/>
+          </a:lnRef>
+          <a:fillRef idx="0">
+            <a:schemeClr val="accent2"/>
+          </a:fillRef>
+          <a:effectRef idx="1">
+            <a:schemeClr val="accent2"/>
+          </a:effectRef>
+          <a:fontRef idx="minor">
+            <a:schemeClr val="tx1"/>
+          </a:fontRef>
+        </p:style>
+      </p:cxnSp>
+      <p:sp>
+        <p:nvSpPr>
+          <p:cNvPr id="16" name="Freeform 15"/>
+          <p:cNvSpPr/>
+          <p:nvPr/>
+        </p:nvSpPr>
+        <p:spPr>
+          <a:xfrm>
+            <a:off x="3452254" y="4191000"/>
+            <a:ext cx="135297" cy="170222"/>
+          </a:xfrm>
+          <a:custGeom>
+            <a:avLst/>
+            <a:gdLst>
+              <a:gd name="connsiteX0" fmla="*/ 0 w 135297"/>
+              <a:gd name="connsiteY0" fmla="*/ 0 h 170222"/>
+              <a:gd name="connsiteX1" fmla="*/ 117839 w 135297"/>
+              <a:gd name="connsiteY1" fmla="*/ 52376 h 170222"/>
+              <a:gd name="connsiteX2" fmla="*/ 104746 w 135297"/>
+              <a:gd name="connsiteY2" fmla="*/ 170222 h 170222"/>
+            </a:gdLst>
+            <a:ahLst/>
+            <a:cxnLst>
+              <a:cxn ang="0">
+                <a:pos x="connsiteX0" y="connsiteY0"/>
+              </a:cxn>
+              <a:cxn ang="0">
+                <a:pos x="connsiteX1" y="connsiteY1"/>
+              </a:cxn>
+              <a:cxn ang="0">
+                <a:pos x="connsiteX2" y="connsiteY2"/>
+              </a:cxn>
+            </a:cxnLst>
+            <a:rect l="l" t="t" r="r" b="b"/>
+            <a:pathLst>
+              <a:path w="135297" h="170222">
+                <a:moveTo>
+                  <a:pt x="0" y="0"/>
+                </a:moveTo>
+                <a:cubicBezTo>
+                  <a:pt x="50190" y="12003"/>
+                  <a:pt x="100381" y="24006"/>
+                  <a:pt x="117839" y="52376"/>
+                </a:cubicBezTo>
+                <a:cubicBezTo>
+                  <a:pt x="135297" y="80746"/>
+                  <a:pt x="104746" y="170222"/>
+                  <a:pt x="104746" y="170222"/>
+                </a:cubicBezTo>
+              </a:path>
+            </a:pathLst>
+          </a:custGeom>
+          <a:noFill/>
+          <a:ln>
+            <a:solidFill>
+              <a:schemeClr val="tx1"/>
+            </a:solidFill>
+          </a:ln>
+        </p:spPr>
+        <p:style>
+          <a:lnRef idx="2">
+            <a:schemeClr val="accent1"/>
+          </a:lnRef>
+          <a:fillRef idx="0">
+            <a:schemeClr val="accent1"/>
+          </a:fillRef>
+          <a:effectRef idx="1">
+            <a:schemeClr val="accent1"/>
+          </a:effectRef>
+          <a:fontRef idx="minor">
+            <a:schemeClr val="tx1"/>
+          </a:fontRef>
+        </p:style>
+        <p:txBody>
+          <a:bodyPr rtlCol="0" anchor="ctr"/>
+          <a:lstStyle/>
+          <a:p>
+            <a:pPr algn="ctr"/>
+            <a:endParaRPr lang="en-US"/>
+          </a:p>
+        </p:txBody>
+      </p:sp>
+      <p:sp>
+        <p:nvSpPr>
+          <p:cNvPr id="17" name="TextBox 16"/>
+          <p:cNvSpPr txBox="1"/>
+          <p:nvPr/>
+        </p:nvSpPr>
+        <p:spPr>
+          <a:xfrm>
+            <a:off x="3543905" y="3960974"/>
+            <a:ext cx="468152" cy="369332"/>
+          </a:xfrm>
+          <a:prstGeom prst="rect">
+            <a:avLst/>
+          </a:prstGeom>
+          <a:noFill/>
+        </p:spPr>
+        <p:txBody>
+          <a:bodyPr wrap="square" rtlCol="0">
+            <a:spAutoFit/>
+          </a:bodyPr>
+          <a:lstStyle/>
+          <a:p>
+            <a:r>
+              <a:rPr lang="en-US" dirty="0" err="1" smtClean="0">
+                <a:latin typeface="Arial"/>
+                <a:cs typeface="Arial"/>
+              </a:rPr>
+              <a:t>Θ</a:t>
+            </a:r>
+            <a:endParaRPr lang="en-US" dirty="0"/>
+          </a:p>
+        </p:txBody>
+      </p:sp>
+      <p:sp>
+        <p:nvSpPr>
+          <p:cNvPr id="20" name="Rectangle 19"/>
+          <p:cNvSpPr/>
+          <p:nvPr/>
+        </p:nvSpPr>
+        <p:spPr>
+          <a:xfrm>
+            <a:off x="4689974" y="2787134"/>
+            <a:ext cx="300082" cy="369332"/>
+          </a:xfrm>
+          <a:prstGeom prst="rect">
+            <a:avLst/>
+          </a:prstGeom>
+        </p:spPr>
+        <p:txBody>
+          <a:bodyPr wrap="none">
+            <a:spAutoFit/>
+          </a:bodyPr>
+          <a:lstStyle/>
+          <a:p>
+            <a:r>
+              <a:rPr lang="en-US" smtClean="0">
+                <a:latin typeface="Arial"/>
+                <a:cs typeface="Arial"/>
+              </a:rPr>
+              <a:t>x</a:t>
+            </a:r>
+            <a:endParaRPr lang="en-US" dirty="0"/>
+          </a:p>
+        </p:txBody>
+      </p:sp>
+      <p:sp>
+        <p:nvSpPr>
+          <p:cNvPr id="21" name="Rectangle 20"/>
+          <p:cNvSpPr/>
+          <p:nvPr/>
+        </p:nvSpPr>
+        <p:spPr>
+          <a:xfrm>
+            <a:off x="5334000" y="3429000"/>
+            <a:ext cx="235950" cy="369332"/>
+          </a:xfrm>
+          <a:prstGeom prst="rect">
+            <a:avLst/>
+          </a:prstGeom>
+        </p:spPr>
+        <p:txBody>
+          <a:bodyPr wrap="none">
+            <a:spAutoFit/>
+          </a:bodyPr>
+          <a:lstStyle/>
+          <a:p>
+            <a:r>
+              <a:rPr lang="en-US" dirty="0" err="1">
+                <a:latin typeface="Arial"/>
+                <a:cs typeface="Arial"/>
+              </a:rPr>
+              <a:t>i</a:t>
+            </a:r>
+            <a:endParaRPr lang="en-US" dirty="0"/>
+          </a:p>
+        </p:txBody>
+      </p:sp>
     </p:spTree>
   </p:cSld>
   <p:clrMapOvr>
     <a:masterClrMapping/>
   </p:clrMapOvr>
+  <p:timing>
+    <p:tnLst>
+      <p:par>
+        <p:cTn id="1" dur="indefinite" restart="never" nodeType="tmRoot"/>
+      </p:par>
+    </p:tnLst>
+  </p:timing>
+</p:sld>
+</file>
+
+<file path=ppt/slides/slide7.xml><?xml version="1.0" encoding="utf-8"?>
+<p:sld xmlns:a="http://schemas.openxmlformats.org/drawingml/2006/main" xmlns:r="http://schemas.openxmlformats.org/officeDocument/2006/relationships" xmlns:mc="http://schemas.openxmlformats.org/markup-compatibility/2006" xmlns:mv="urn:schemas-microsoft-com:mac:vml" xmlns:p="http://schemas.openxmlformats.org/presentationml/2006/main" mc:Ignorable="mv" mc:PreserveAttributes="mv:*">
+  <p:cSld>
+    <p:spTree>
+      <p:nvGrpSpPr>
+        <p:cNvPr id="1" name=""/>
+        <p:cNvGrpSpPr/>
+        <p:nvPr/>
+      </p:nvGrpSpPr>
+      <p:grpSpPr>
+        <a:xfrm>
+          <a:off x="0" y="0"/>
+          <a:ext cx="0" cy="0"/>
+          <a:chOff x="0" y="0"/>
+          <a:chExt cx="0" cy="0"/>
+        </a:xfrm>
+      </p:grpSpPr>
+      <p:sp>
+        <p:nvSpPr>
+          <p:cNvPr id="2" name="Title 1"/>
+          <p:cNvSpPr>
+            <a:spLocks noGrp="1"/>
+          </p:cNvSpPr>
+          <p:nvPr>
+            <p:ph type="title"/>
+          </p:nvPr>
+        </p:nvSpPr>
+        <p:spPr/>
+        <p:txBody>
+          <a:bodyPr>
+            <a:normAutofit/>
+          </a:bodyPr>
+          <a:lstStyle/>
+          <a:p>
+            <a:pPr algn="l"/>
+            <a:r>
+              <a:rPr lang="en-US" sz="3600" dirty="0">
+                <a:solidFill>
+                  <a:srgbClr val="FF0000"/>
+                </a:solidFill>
+                <a:latin typeface="Arial"/>
+                <a:cs typeface="Arial"/>
+              </a:rPr>
+              <a:t>A</a:t>
+            </a:r>
+            <a:r>
+              <a:rPr lang="en-US" sz="3600" dirty="0" smtClean="0">
+                <a:solidFill>
+                  <a:srgbClr val="FF0000"/>
+                </a:solidFill>
+                <a:latin typeface="Arial"/>
+                <a:cs typeface="Arial"/>
+              </a:rPr>
+              <a:t>dvantages</a:t>
+            </a:r>
+            <a:r>
+              <a:rPr lang="en-US" sz="3600" dirty="0" smtClean="0">
+                <a:latin typeface="Arial"/>
+                <a:cs typeface="Arial"/>
+              </a:rPr>
+              <a:t> of Content-Based System</a:t>
+            </a:r>
+            <a:endParaRPr lang="en-US" sz="3600" dirty="0">
+              <a:solidFill>
+                <a:srgbClr val="FF0000"/>
+              </a:solidFill>
+              <a:latin typeface="Arial"/>
+              <a:cs typeface="Arial"/>
+            </a:endParaRPr>
+          </a:p>
+        </p:txBody>
+      </p:sp>
+      <p:sp>
+        <p:nvSpPr>
+          <p:cNvPr id="3" name="Content Placeholder 2"/>
+          <p:cNvSpPr>
+            <a:spLocks noGrp="1"/>
+          </p:cNvSpPr>
+          <p:nvPr>
+            <p:ph idx="1"/>
+          </p:nvPr>
+        </p:nvSpPr>
+        <p:spPr>
+          <a:xfrm>
+            <a:off x="457200" y="1600201"/>
+            <a:ext cx="8229600" cy="3810000"/>
+          </a:xfrm>
+        </p:spPr>
+        <p:txBody>
+          <a:bodyPr>
+            <a:normAutofit fontScale="92500" lnSpcReduction="10000"/>
+          </a:bodyPr>
+          <a:lstStyle/>
+          <a:p>
+            <a:r>
+              <a:rPr lang="en-US" dirty="0" smtClean="0">
+                <a:latin typeface="Arial"/>
+                <a:cs typeface="Arial"/>
+              </a:rPr>
+              <a:t>No need for data on other users</a:t>
+            </a:r>
+          </a:p>
+          <a:p>
+            <a:r>
+              <a:rPr lang="en-US" dirty="0" smtClean="0">
+                <a:latin typeface="Arial"/>
+                <a:cs typeface="Arial"/>
+              </a:rPr>
+              <a:t>Able to recommend to users with unique tastes</a:t>
+            </a:r>
+          </a:p>
+          <a:p>
+            <a:r>
+              <a:rPr lang="en-US" dirty="0" smtClean="0">
+                <a:latin typeface="Arial"/>
+                <a:cs typeface="Arial"/>
+              </a:rPr>
+              <a:t>Able to recommend new and unpopular items (no first rater problem)</a:t>
+            </a:r>
+          </a:p>
+          <a:p>
+            <a:r>
+              <a:rPr lang="en-US" dirty="0" smtClean="0">
+                <a:latin typeface="Arial"/>
+                <a:cs typeface="Arial"/>
+              </a:rPr>
+              <a:t>There are explanations for recommended items (content features that caused an item to be recommended</a:t>
+            </a:r>
+          </a:p>
+        </p:txBody>
+      </p:sp>
+      <p:cxnSp>
+        <p:nvCxnSpPr>
+          <p:cNvPr id="6" name="Straight Connector 5"/>
+          <p:cNvCxnSpPr/>
+          <p:nvPr/>
+        </p:nvCxnSpPr>
+        <p:spPr>
+          <a:xfrm>
+            <a:off x="457200" y="1219200"/>
+            <a:ext cx="8458200" cy="1588"/>
+          </a:xfrm>
+          <a:prstGeom prst="line">
+            <a:avLst/>
+          </a:prstGeom>
+        </p:spPr>
+        <p:style>
+          <a:lnRef idx="2">
+            <a:schemeClr val="accent1"/>
+          </a:lnRef>
+          <a:fillRef idx="0">
+            <a:schemeClr val="accent1"/>
+          </a:fillRef>
+          <a:effectRef idx="1">
+            <a:schemeClr val="accent1"/>
+          </a:effectRef>
+          <a:fontRef idx="minor">
+            <a:schemeClr val="tx1"/>
+          </a:fontRef>
+        </p:style>
+      </p:cxnSp>
+      <p:sp>
+        <p:nvSpPr>
+          <p:cNvPr id="13" name="TextBox 12"/>
+          <p:cNvSpPr txBox="1"/>
+          <p:nvPr/>
+        </p:nvSpPr>
+        <p:spPr>
+          <a:xfrm>
+            <a:off x="5486400" y="6553200"/>
+            <a:ext cx="3200400" cy="307777"/>
+          </a:xfrm>
+          <a:prstGeom prst="rect">
+            <a:avLst/>
+          </a:prstGeom>
+          <a:noFill/>
+        </p:spPr>
+        <p:txBody>
+          <a:bodyPr wrap="square" rtlCol="0">
+            <a:spAutoFit/>
+          </a:bodyPr>
+          <a:lstStyle/>
+          <a:p>
+            <a:r>
+              <a:rPr lang="en-US" sz="1400" dirty="0" smtClean="0">
+                <a:latin typeface="Arial"/>
+                <a:cs typeface="Arial"/>
+              </a:rPr>
+              <a:t>Mining of Massive Datasets</a:t>
+            </a:r>
+            <a:endParaRPr lang="en-US" sz="1400" dirty="0">
+              <a:latin typeface="Arial"/>
+              <a:cs typeface="Arial"/>
+            </a:endParaRPr>
+          </a:p>
+        </p:txBody>
+      </p:sp>
+    </p:spTree>
+  </p:cSld>
+  <p:clrMapOvr>
+    <a:masterClrMapping/>
+  </p:clrMapOvr>
+  <p:timing>
+    <p:tnLst>
+      <p:par>
+        <p:cTn id="1" dur="indefinite" restart="never" nodeType="tmRoot"/>
+      </p:par>
+    </p:tnLst>
+  </p:timing>
+</p:sld>
+</file>
+
+<file path=ppt/slides/slide8.xml><?xml version="1.0" encoding="utf-8"?>
+<p:sld xmlns:a="http://schemas.openxmlformats.org/drawingml/2006/main" xmlns:r="http://schemas.openxmlformats.org/officeDocument/2006/relationships" xmlns:mc="http://schemas.openxmlformats.org/markup-compatibility/2006" xmlns:mv="urn:schemas-microsoft-com:mac:vml" xmlns:p="http://schemas.openxmlformats.org/presentationml/2006/main" mc:Ignorable="mv" mc:PreserveAttributes="mv:*">
+  <p:cSld>
+    <p:spTree>
+      <p:nvGrpSpPr>
+        <p:cNvPr id="1" name=""/>
+        <p:cNvGrpSpPr/>
+        <p:nvPr/>
+      </p:nvGrpSpPr>
+      <p:grpSpPr>
+        <a:xfrm>
+          <a:off x="0" y="0"/>
+          <a:ext cx="0" cy="0"/>
+          <a:chOff x="0" y="0"/>
+          <a:chExt cx="0" cy="0"/>
+        </a:xfrm>
+      </p:grpSpPr>
+      <p:sp>
+        <p:nvSpPr>
+          <p:cNvPr id="2" name="Title 1"/>
+          <p:cNvSpPr>
+            <a:spLocks noGrp="1"/>
+          </p:cNvSpPr>
+          <p:nvPr>
+            <p:ph type="title"/>
+          </p:nvPr>
+        </p:nvSpPr>
+        <p:spPr/>
+        <p:txBody>
+          <a:bodyPr>
+            <a:normAutofit fontScale="90000"/>
+          </a:bodyPr>
+          <a:lstStyle/>
+          <a:p>
+            <a:pPr algn="l"/>
+            <a:r>
+              <a:rPr lang="en-US" sz="3600" dirty="0" smtClean="0">
+                <a:solidFill>
+                  <a:srgbClr val="FF0000"/>
+                </a:solidFill>
+                <a:latin typeface="Arial"/>
+                <a:cs typeface="Arial"/>
+              </a:rPr>
+              <a:t>Disadvantages</a:t>
+            </a:r>
+            <a:r>
+              <a:rPr lang="en-US" sz="3600" dirty="0" smtClean="0">
+                <a:latin typeface="Arial"/>
+                <a:cs typeface="Arial"/>
+              </a:rPr>
+              <a:t> of Content-Based System</a:t>
+            </a:r>
+            <a:endParaRPr lang="en-US" sz="3600" dirty="0">
+              <a:solidFill>
+                <a:srgbClr val="FF0000"/>
+              </a:solidFill>
+              <a:latin typeface="Arial"/>
+              <a:cs typeface="Arial"/>
+            </a:endParaRPr>
+          </a:p>
+        </p:txBody>
+      </p:sp>
+      <p:sp>
+        <p:nvSpPr>
+          <p:cNvPr id="3" name="Content Placeholder 2"/>
+          <p:cNvSpPr>
+            <a:spLocks noGrp="1"/>
+          </p:cNvSpPr>
+          <p:nvPr>
+            <p:ph idx="1"/>
+          </p:nvPr>
+        </p:nvSpPr>
+        <p:spPr>
+          <a:xfrm>
+            <a:off x="457200" y="1600201"/>
+            <a:ext cx="8229600" cy="3810000"/>
+          </a:xfrm>
+        </p:spPr>
+        <p:txBody>
+          <a:bodyPr>
+            <a:normAutofit/>
+          </a:bodyPr>
+          <a:lstStyle/>
+          <a:p>
+            <a:r>
+              <a:rPr lang="en-US" dirty="0" smtClean="0">
+                <a:latin typeface="Arial"/>
+                <a:cs typeface="Arial"/>
+              </a:rPr>
+              <a:t>Finding the appropriate features is hard</a:t>
+            </a:r>
+          </a:p>
+          <a:p>
+            <a:r>
+              <a:rPr lang="en-US" dirty="0" smtClean="0">
+                <a:latin typeface="Arial"/>
+                <a:cs typeface="Arial"/>
+              </a:rPr>
+              <a:t>Oversimplification</a:t>
+            </a:r>
+          </a:p>
+          <a:p>
+            <a:pPr lvl="1"/>
+            <a:r>
+              <a:rPr lang="en-US" dirty="0" smtClean="0">
+                <a:latin typeface="Arial"/>
+                <a:cs typeface="Arial"/>
+              </a:rPr>
+              <a:t>Can’t give rise to incremental sales (sales that would not have happened otherwise) </a:t>
+            </a:r>
+          </a:p>
+          <a:p>
+            <a:r>
+              <a:rPr lang="en-US" dirty="0" smtClean="0">
+                <a:latin typeface="Arial"/>
+                <a:cs typeface="Arial"/>
+              </a:rPr>
+              <a:t>Cold-start problem for new users</a:t>
+            </a:r>
+          </a:p>
+        </p:txBody>
+      </p:sp>
+      <p:cxnSp>
+        <p:nvCxnSpPr>
+          <p:cNvPr id="6" name="Straight Connector 5"/>
+          <p:cNvCxnSpPr/>
+          <p:nvPr/>
+        </p:nvCxnSpPr>
+        <p:spPr>
+          <a:xfrm>
+            <a:off x="457200" y="1219200"/>
+            <a:ext cx="8458200" cy="1588"/>
+          </a:xfrm>
+          <a:prstGeom prst="line">
+            <a:avLst/>
+          </a:prstGeom>
+        </p:spPr>
+        <p:style>
+          <a:lnRef idx="2">
+            <a:schemeClr val="accent1"/>
+          </a:lnRef>
+          <a:fillRef idx="0">
+            <a:schemeClr val="accent1"/>
+          </a:fillRef>
+          <a:effectRef idx="1">
+            <a:schemeClr val="accent1"/>
+          </a:effectRef>
+          <a:fontRef idx="minor">
+            <a:schemeClr val="tx1"/>
+          </a:fontRef>
+        </p:style>
+      </p:cxnSp>
+      <p:sp>
+        <p:nvSpPr>
+          <p:cNvPr id="13" name="TextBox 12"/>
+          <p:cNvSpPr txBox="1"/>
+          <p:nvPr/>
+        </p:nvSpPr>
+        <p:spPr>
+          <a:xfrm>
+            <a:off x="5486400" y="6553200"/>
+            <a:ext cx="3200400" cy="307777"/>
+          </a:xfrm>
+          <a:prstGeom prst="rect">
+            <a:avLst/>
+          </a:prstGeom>
+          <a:noFill/>
+        </p:spPr>
+        <p:txBody>
+          <a:bodyPr wrap="square" rtlCol="0">
+            <a:spAutoFit/>
+          </a:bodyPr>
+          <a:lstStyle/>
+          <a:p>
+            <a:r>
+              <a:rPr lang="en-US" sz="1400" dirty="0" smtClean="0">
+                <a:latin typeface="Arial"/>
+                <a:cs typeface="Arial"/>
+              </a:rPr>
+              <a:t>Mining of Massive Datasets</a:t>
+            </a:r>
+            <a:endParaRPr lang="en-US" sz="1400" dirty="0">
+              <a:latin typeface="Arial"/>
+              <a:cs typeface="Arial"/>
+            </a:endParaRPr>
+          </a:p>
+        </p:txBody>
+      </p:sp>
+    </p:spTree>
+  </p:cSld>
+  <p:clrMapOvr>
+    <a:masterClrMapping/>
+  </p:clrMapOvr>
+  <p:timing>
+    <p:tnLst>
+      <p:par>
+        <p:cTn id="1" dur="indefinite" restart="never" nodeType="tmRoot"/>
+      </p:par>
+    </p:tnLst>
+  </p:timing>
 </p:sld>
 </file>
 

</xml_diff>

<commit_message>
Finish contructing feature matrix
</commit_message>
<xml_diff>
--- a/content-based.pptx
+++ b/content-based.pptx
@@ -12,7 +12,8 @@
     <p:sldId id="261" r:id="rId6"/>
     <p:sldId id="262" r:id="rId7"/>
     <p:sldId id="265" r:id="rId8"/>
-    <p:sldId id="264" r:id="rId9"/>
+    <p:sldId id="266" r:id="rId9"/>
+    <p:sldId id="264" r:id="rId10"/>
   </p:sldIdLst>
   <p:sldSz cx="9144000" cy="6858000" type="screen4x3"/>
   <p:notesSz cx="6858000" cy="9144000"/>
@@ -295,7 +296,8 @@
           <a:p>
             <a:fld id="{0C8DAF97-2612-DB46-9F4D-8BB1F929A543}" type="datetimeFigureOut">
               <a:rPr lang="en-US" smtClean="0"/>
-              <a:t>4/14/17</a:t>
+              <a:pPr/>
+              <a:t>4/27/17</a:t>
             </a:fld>
             <a:endParaRPr lang="en-US"/>
           </a:p>
@@ -337,6 +339,7 @@
           <a:p>
             <a:fld id="{8A20921C-2F72-0E4E-BB3A-EDCBA141959C}" type="slidenum">
               <a:rPr lang="en-US" smtClean="0"/>
+              <a:pPr/>
               <a:t>‹#›</a:t>
             </a:fld>
             <a:endParaRPr lang="en-US"/>
@@ -460,7 +463,8 @@
           <a:p>
             <a:fld id="{0C8DAF97-2612-DB46-9F4D-8BB1F929A543}" type="datetimeFigureOut">
               <a:rPr lang="en-US" smtClean="0"/>
-              <a:t>4/14/17</a:t>
+              <a:pPr/>
+              <a:t>4/27/17</a:t>
             </a:fld>
             <a:endParaRPr lang="en-US"/>
           </a:p>
@@ -502,6 +506,7 @@
           <a:p>
             <a:fld id="{8A20921C-2F72-0E4E-BB3A-EDCBA141959C}" type="slidenum">
               <a:rPr lang="en-US" smtClean="0"/>
+              <a:pPr/>
               <a:t>‹#›</a:t>
             </a:fld>
             <a:endParaRPr lang="en-US"/>
@@ -635,7 +640,8 @@
           <a:p>
             <a:fld id="{0C8DAF97-2612-DB46-9F4D-8BB1F929A543}" type="datetimeFigureOut">
               <a:rPr lang="en-US" smtClean="0"/>
-              <a:t>4/14/17</a:t>
+              <a:pPr/>
+              <a:t>4/27/17</a:t>
             </a:fld>
             <a:endParaRPr lang="en-US"/>
           </a:p>
@@ -677,6 +683,7 @@
           <a:p>
             <a:fld id="{8A20921C-2F72-0E4E-BB3A-EDCBA141959C}" type="slidenum">
               <a:rPr lang="en-US" smtClean="0"/>
+              <a:pPr/>
               <a:t>‹#›</a:t>
             </a:fld>
             <a:endParaRPr lang="en-US"/>
@@ -800,7 +807,8 @@
           <a:p>
             <a:fld id="{0C8DAF97-2612-DB46-9F4D-8BB1F929A543}" type="datetimeFigureOut">
               <a:rPr lang="en-US" smtClean="0"/>
-              <a:t>4/14/17</a:t>
+              <a:pPr/>
+              <a:t>4/27/17</a:t>
             </a:fld>
             <a:endParaRPr lang="en-US"/>
           </a:p>
@@ -842,6 +850,7 @@
           <a:p>
             <a:fld id="{8A20921C-2F72-0E4E-BB3A-EDCBA141959C}" type="slidenum">
               <a:rPr lang="en-US" smtClean="0"/>
+              <a:pPr/>
               <a:t>‹#›</a:t>
             </a:fld>
             <a:endParaRPr lang="en-US"/>
@@ -1041,7 +1050,8 @@
           <a:p>
             <a:fld id="{0C8DAF97-2612-DB46-9F4D-8BB1F929A543}" type="datetimeFigureOut">
               <a:rPr lang="en-US" smtClean="0"/>
-              <a:t>4/14/17</a:t>
+              <a:pPr/>
+              <a:t>4/27/17</a:t>
             </a:fld>
             <a:endParaRPr lang="en-US"/>
           </a:p>
@@ -1083,6 +1093,7 @@
           <a:p>
             <a:fld id="{8A20921C-2F72-0E4E-BB3A-EDCBA141959C}" type="slidenum">
               <a:rPr lang="en-US" smtClean="0"/>
+              <a:pPr/>
               <a:t>‹#›</a:t>
             </a:fld>
             <a:endParaRPr lang="en-US"/>
@@ -1324,7 +1335,8 @@
           <a:p>
             <a:fld id="{0C8DAF97-2612-DB46-9F4D-8BB1F929A543}" type="datetimeFigureOut">
               <a:rPr lang="en-US" smtClean="0"/>
-              <a:t>4/14/17</a:t>
+              <a:pPr/>
+              <a:t>4/27/17</a:t>
             </a:fld>
             <a:endParaRPr lang="en-US"/>
           </a:p>
@@ -1366,6 +1378,7 @@
           <a:p>
             <a:fld id="{8A20921C-2F72-0E4E-BB3A-EDCBA141959C}" type="slidenum">
               <a:rPr lang="en-US" smtClean="0"/>
+              <a:pPr/>
               <a:t>‹#›</a:t>
             </a:fld>
             <a:endParaRPr lang="en-US"/>
@@ -1741,7 +1754,8 @@
           <a:p>
             <a:fld id="{0C8DAF97-2612-DB46-9F4D-8BB1F929A543}" type="datetimeFigureOut">
               <a:rPr lang="en-US" smtClean="0"/>
-              <a:t>4/14/17</a:t>
+              <a:pPr/>
+              <a:t>4/27/17</a:t>
             </a:fld>
             <a:endParaRPr lang="en-US"/>
           </a:p>
@@ -1783,6 +1797,7 @@
           <a:p>
             <a:fld id="{8A20921C-2F72-0E4E-BB3A-EDCBA141959C}" type="slidenum">
               <a:rPr lang="en-US" smtClean="0"/>
+              <a:pPr/>
               <a:t>‹#›</a:t>
             </a:fld>
             <a:endParaRPr lang="en-US"/>
@@ -1854,7 +1869,8 @@
           <a:p>
             <a:fld id="{0C8DAF97-2612-DB46-9F4D-8BB1F929A543}" type="datetimeFigureOut">
               <a:rPr lang="en-US" smtClean="0"/>
-              <a:t>4/14/17</a:t>
+              <a:pPr/>
+              <a:t>4/27/17</a:t>
             </a:fld>
             <a:endParaRPr lang="en-US"/>
           </a:p>
@@ -1896,6 +1912,7 @@
           <a:p>
             <a:fld id="{8A20921C-2F72-0E4E-BB3A-EDCBA141959C}" type="slidenum">
               <a:rPr lang="en-US" smtClean="0"/>
+              <a:pPr/>
               <a:t>‹#›</a:t>
             </a:fld>
             <a:endParaRPr lang="en-US"/>
@@ -1944,7 +1961,8 @@
           <a:p>
             <a:fld id="{0C8DAF97-2612-DB46-9F4D-8BB1F929A543}" type="datetimeFigureOut">
               <a:rPr lang="en-US" smtClean="0"/>
-              <a:t>4/14/17</a:t>
+              <a:pPr/>
+              <a:t>4/27/17</a:t>
             </a:fld>
             <a:endParaRPr lang="en-US"/>
           </a:p>
@@ -1986,6 +2004,7 @@
           <a:p>
             <a:fld id="{8A20921C-2F72-0E4E-BB3A-EDCBA141959C}" type="slidenum">
               <a:rPr lang="en-US" smtClean="0"/>
+              <a:pPr/>
               <a:t>‹#›</a:t>
             </a:fld>
             <a:endParaRPr lang="en-US"/>
@@ -2216,7 +2235,8 @@
           <a:p>
             <a:fld id="{0C8DAF97-2612-DB46-9F4D-8BB1F929A543}" type="datetimeFigureOut">
               <a:rPr lang="en-US" smtClean="0"/>
-              <a:t>4/14/17</a:t>
+              <a:pPr/>
+              <a:t>4/27/17</a:t>
             </a:fld>
             <a:endParaRPr lang="en-US"/>
           </a:p>
@@ -2258,6 +2278,7 @@
           <a:p>
             <a:fld id="{8A20921C-2F72-0E4E-BB3A-EDCBA141959C}" type="slidenum">
               <a:rPr lang="en-US" smtClean="0"/>
+              <a:pPr/>
               <a:t>‹#›</a:t>
             </a:fld>
             <a:endParaRPr lang="en-US"/>
@@ -2464,7 +2485,8 @@
           <a:p>
             <a:fld id="{0C8DAF97-2612-DB46-9F4D-8BB1F929A543}" type="datetimeFigureOut">
               <a:rPr lang="en-US" smtClean="0"/>
-              <a:t>4/14/17</a:t>
+              <a:pPr/>
+              <a:t>4/27/17</a:t>
             </a:fld>
             <a:endParaRPr lang="en-US"/>
           </a:p>
@@ -2506,6 +2528,7 @@
           <a:p>
             <a:fld id="{8A20921C-2F72-0E4E-BB3A-EDCBA141959C}" type="slidenum">
               <a:rPr lang="en-US" smtClean="0"/>
+              <a:pPr/>
               <a:t>‹#›</a:t>
             </a:fld>
             <a:endParaRPr lang="en-US"/>
@@ -2672,7 +2695,8 @@
           <a:p>
             <a:fld id="{0C8DAF97-2612-DB46-9F4D-8BB1F929A543}" type="datetimeFigureOut">
               <a:rPr lang="en-US" smtClean="0"/>
-              <a:t>4/14/17</a:t>
+              <a:pPr/>
+              <a:t>4/27/17</a:t>
             </a:fld>
             <a:endParaRPr lang="en-US"/>
           </a:p>
@@ -2750,6 +2774,7 @@
           <a:p>
             <a:fld id="{8A20921C-2F72-0E4E-BB3A-EDCBA141959C}" type="slidenum">
               <a:rPr lang="en-US" smtClean="0"/>
+              <a:pPr/>
               <a:t>‹#›</a:t>
             </a:fld>
             <a:endParaRPr lang="en-US"/>
@@ -3706,8 +3731,8 @@
                 <a:tableStyleId>{17292A2E-F333-43FB-9621-5CBBE7FDCDCB}</a:tableStyleId>
               </a:tblPr>
               <a:tblGrid>
-                <a:gridCol w="929640"/>
-                <a:gridCol w="908020"/>
+                <a:gridCol w="838200"/>
+                <a:gridCol w="999460"/>
                 <a:gridCol w="951260"/>
                 <a:gridCol w="929640"/>
                 <a:gridCol w="929640"/>
@@ -5643,10 +5668,6 @@
                         </a:rPr>
                         <a:t>2</a:t>
                       </a:r>
-                      <a:endParaRPr lang="en-US" sz="1400" dirty="0" smtClean="0">
-                        <a:latin typeface="Arial"/>
-                        <a:cs typeface="Arial"/>
-                      </a:endParaRPr>
                     </a:p>
                   </a:txBody>
                   <a:tcPr>
@@ -5671,10 +5692,6 @@
                         </a:rPr>
                         <a:t>-2</a:t>
                       </a:r>
-                      <a:endParaRPr lang="en-US" sz="1400" dirty="0" smtClean="0">
-                        <a:latin typeface="Arial"/>
-                        <a:cs typeface="Arial"/>
-                      </a:endParaRPr>
                     </a:p>
                   </a:txBody>
                   <a:tcPr>
@@ -6586,6 +6603,418 @@
 </file>
 
 <file path=ppt/slides/slide8.xml><?xml version="1.0" encoding="utf-8"?>
+<p:sld xmlns:a="http://schemas.openxmlformats.org/drawingml/2006/main" xmlns:r="http://schemas.openxmlformats.org/officeDocument/2006/relationships" xmlns:mc="http://schemas.openxmlformats.org/markup-compatibility/2006" xmlns:mv="urn:schemas-microsoft-com:mac:vml" xmlns:p="http://schemas.openxmlformats.org/presentationml/2006/main" mc:Ignorable="mv" mc:PreserveAttributes="mv:*">
+  <p:cSld>
+    <p:spTree>
+      <p:nvGrpSpPr>
+        <p:cNvPr id="1" name=""/>
+        <p:cNvGrpSpPr/>
+        <p:nvPr/>
+      </p:nvGrpSpPr>
+      <p:grpSpPr>
+        <a:xfrm>
+          <a:off x="0" y="0"/>
+          <a:ext cx="0" cy="0"/>
+          <a:chOff x="0" y="0"/>
+          <a:chExt cx="0" cy="0"/>
+        </a:xfrm>
+      </p:grpSpPr>
+      <p:sp>
+        <p:nvSpPr>
+          <p:cNvPr id="2" name="Title 1"/>
+          <p:cNvSpPr>
+            <a:spLocks noGrp="1"/>
+          </p:cNvSpPr>
+          <p:nvPr>
+            <p:ph type="title"/>
+          </p:nvPr>
+        </p:nvSpPr>
+        <p:spPr/>
+        <p:txBody>
+          <a:bodyPr/>
+          <a:lstStyle/>
+          <a:p>
+            <a:endParaRPr lang="en-US" dirty="0"/>
+          </a:p>
+        </p:txBody>
+      </p:sp>
+      <p:graphicFrame>
+        <p:nvGraphicFramePr>
+          <p:cNvPr id="6" name="Table 5"/>
+          <p:cNvGraphicFramePr>
+            <a:graphicFrameLocks noGrp="1"/>
+          </p:cNvGraphicFramePr>
+          <p:nvPr/>
+        </p:nvGraphicFramePr>
+        <p:xfrm>
+          <a:off x="1066800" y="2362200"/>
+          <a:ext cx="4419600" cy="1619250"/>
+        </p:xfrm>
+        <a:graphic>
+          <a:graphicData uri="http://schemas.openxmlformats.org/drawingml/2006/table">
+            <a:tbl>
+              <a:tblPr firstRow="1" bandRow="1" bandCol="1">
+                <a:tableStyleId>{17292A2E-F333-43FB-9621-5CBBE7FDCDCB}</a:tableStyleId>
+              </a:tblPr>
+              <a:tblGrid>
+                <a:gridCol w="879423"/>
+                <a:gridCol w="1048614"/>
+                <a:gridCol w="1272363"/>
+                <a:gridCol w="1219200"/>
+              </a:tblGrid>
+              <a:tr h="323850">
+                <a:tc>
+                  <a:txBody>
+                    <a:bodyPr/>
+                    <a:lstStyle/>
+                    <a:p>
+                      <a:pPr algn="ctr"/>
+                      <a:endParaRPr lang="en-US" sz="1400" dirty="0">
+                        <a:latin typeface="Arial"/>
+                        <a:cs typeface="Arial"/>
+                      </a:endParaRPr>
+                    </a:p>
+                  </a:txBody>
+                  <a:tcPr/>
+                </a:tc>
+                <a:tc>
+                  <a:txBody>
+                    <a:bodyPr/>
+                    <a:lstStyle/>
+                    <a:p>
+                      <a:pPr algn="ctr"/>
+                      <a:r>
+                        <a:rPr lang="en-US" sz="1400" dirty="0" err="1" smtClean="0">
+                          <a:latin typeface="+mn-lt"/>
+                          <a:cs typeface="+mn-cs"/>
+                        </a:rPr>
+                        <a:t>beer_abv</a:t>
+                      </a:r>
+                      <a:endParaRPr lang="en-US" sz="1400" dirty="0">
+                        <a:latin typeface="Arial"/>
+                        <a:cs typeface="Arial"/>
+                      </a:endParaRPr>
+                    </a:p>
+                  </a:txBody>
+                  <a:tcPr/>
+                </a:tc>
+                <a:tc>
+                  <a:txBody>
+                    <a:bodyPr/>
+                    <a:lstStyle/>
+                    <a:p>
+                      <a:pPr algn="ctr"/>
+                      <a:r>
+                        <a:rPr lang="en-US" sz="1400" dirty="0" err="1" smtClean="0">
+                          <a:latin typeface="+mn-lt"/>
+                          <a:cs typeface="+mn-cs"/>
+                        </a:rPr>
+                        <a:t>brewery_id</a:t>
+                      </a:r>
+                      <a:endParaRPr lang="en-US" sz="1400" dirty="0">
+                        <a:latin typeface="Arial"/>
+                        <a:cs typeface="Arial"/>
+                      </a:endParaRPr>
+                    </a:p>
+                  </a:txBody>
+                  <a:tcPr/>
+                </a:tc>
+                <a:tc>
+                  <a:txBody>
+                    <a:bodyPr/>
+                    <a:lstStyle/>
+                    <a:p>
+                      <a:pPr algn="ctr"/>
+                      <a:r>
+                        <a:rPr lang="en-US" sz="1400" dirty="0" err="1" smtClean="0">
+                          <a:latin typeface="+mn-lt"/>
+                          <a:cs typeface="+mn-cs"/>
+                        </a:rPr>
+                        <a:t>beer_style</a:t>
+                      </a:r>
+                      <a:endParaRPr lang="en-US" sz="1400" dirty="0">
+                        <a:latin typeface="Arial"/>
+                        <a:cs typeface="Arial"/>
+                      </a:endParaRPr>
+                    </a:p>
+                  </a:txBody>
+                  <a:tcPr/>
+                </a:tc>
+              </a:tr>
+              <a:tr h="323850">
+                <a:tc>
+                  <a:txBody>
+                    <a:bodyPr/>
+                    <a:lstStyle/>
+                    <a:p>
+                      <a:pPr algn="ctr"/>
+                      <a:r>
+                        <a:rPr lang="en-US" sz="1400" dirty="0" smtClean="0"/>
+                        <a:t>beer1</a:t>
+                      </a:r>
+                      <a:endParaRPr lang="en-US" sz="1400" dirty="0">
+                        <a:latin typeface="Arial"/>
+                        <a:cs typeface="Arial"/>
+                      </a:endParaRPr>
+                    </a:p>
+                  </a:txBody>
+                  <a:tcPr/>
+                </a:tc>
+                <a:tc>
+                  <a:txBody>
+                    <a:bodyPr/>
+                    <a:lstStyle/>
+                    <a:p>
+                      <a:pPr algn="ctr"/>
+                      <a:endParaRPr lang="en-US" sz="1400" dirty="0">
+                        <a:latin typeface="Arial"/>
+                        <a:cs typeface="Arial"/>
+                      </a:endParaRPr>
+                    </a:p>
+                  </a:txBody>
+                  <a:tcPr/>
+                </a:tc>
+                <a:tc>
+                  <a:txBody>
+                    <a:bodyPr/>
+                    <a:lstStyle/>
+                    <a:p>
+                      <a:pPr algn="ctr"/>
+                      <a:endParaRPr lang="en-US" sz="1400" dirty="0">
+                        <a:latin typeface="Arial"/>
+                        <a:cs typeface="Arial"/>
+                      </a:endParaRPr>
+                    </a:p>
+                  </a:txBody>
+                  <a:tcPr/>
+                </a:tc>
+                <a:tc>
+                  <a:txBody>
+                    <a:bodyPr/>
+                    <a:lstStyle/>
+                    <a:p>
+                      <a:pPr algn="ctr"/>
+                      <a:endParaRPr lang="en-US" sz="1400">
+                        <a:latin typeface="Arial"/>
+                        <a:cs typeface="Arial"/>
+                      </a:endParaRPr>
+                    </a:p>
+                  </a:txBody>
+                  <a:tcPr/>
+                </a:tc>
+              </a:tr>
+              <a:tr h="323850">
+                <a:tc>
+                  <a:txBody>
+                    <a:bodyPr/>
+                    <a:lstStyle/>
+                    <a:p>
+                      <a:pPr algn="ctr"/>
+                      <a:r>
+                        <a:rPr lang="en-US" sz="1400" dirty="0" smtClean="0"/>
+                        <a:t>beer2</a:t>
+                      </a:r>
+                      <a:endParaRPr lang="en-US" sz="1400" dirty="0">
+                        <a:latin typeface="Arial"/>
+                        <a:cs typeface="Arial"/>
+                      </a:endParaRPr>
+                    </a:p>
+                  </a:txBody>
+                  <a:tcPr/>
+                </a:tc>
+                <a:tc>
+                  <a:txBody>
+                    <a:bodyPr/>
+                    <a:lstStyle/>
+                    <a:p>
+                      <a:pPr algn="ctr"/>
+                      <a:endParaRPr lang="en-US" sz="1400" dirty="0">
+                        <a:latin typeface="Arial"/>
+                        <a:cs typeface="Arial"/>
+                      </a:endParaRPr>
+                    </a:p>
+                  </a:txBody>
+                  <a:tcPr/>
+                </a:tc>
+                <a:tc>
+                  <a:txBody>
+                    <a:bodyPr/>
+                    <a:lstStyle/>
+                    <a:p>
+                      <a:pPr algn="ctr"/>
+                      <a:endParaRPr lang="en-US" sz="1400" dirty="0" smtClean="0">
+                        <a:latin typeface="Arial"/>
+                        <a:cs typeface="Arial"/>
+                      </a:endParaRPr>
+                    </a:p>
+                  </a:txBody>
+                  <a:tcPr/>
+                </a:tc>
+                <a:tc>
+                  <a:txBody>
+                    <a:bodyPr/>
+                    <a:lstStyle/>
+                    <a:p>
+                      <a:pPr algn="ctr"/>
+                      <a:endParaRPr lang="en-US" sz="1400" dirty="0" smtClean="0">
+                        <a:latin typeface="Arial"/>
+                        <a:cs typeface="Arial"/>
+                      </a:endParaRPr>
+                    </a:p>
+                  </a:txBody>
+                  <a:tcPr/>
+                </a:tc>
+              </a:tr>
+              <a:tr h="323850">
+                <a:tc>
+                  <a:txBody>
+                    <a:bodyPr/>
+                    <a:lstStyle/>
+                    <a:p>
+                      <a:pPr algn="ctr"/>
+                      <a:r>
+                        <a:rPr lang="en-US" sz="1400" dirty="0" smtClean="0">
+                          <a:latin typeface="+mn-lt"/>
+                          <a:cs typeface="+mn-cs"/>
+                        </a:rPr>
+                        <a:t>beer3</a:t>
+                      </a:r>
+                      <a:endParaRPr lang="en-US" sz="1400" dirty="0">
+                        <a:latin typeface="Arial"/>
+                        <a:cs typeface="Arial"/>
+                      </a:endParaRPr>
+                    </a:p>
+                  </a:txBody>
+                  <a:tcPr/>
+                </a:tc>
+                <a:tc>
+                  <a:txBody>
+                    <a:bodyPr/>
+                    <a:lstStyle/>
+                    <a:p>
+                      <a:pPr algn="ctr"/>
+                      <a:endParaRPr lang="en-US" sz="1400" dirty="0">
+                        <a:latin typeface="Arial"/>
+                        <a:cs typeface="Arial"/>
+                      </a:endParaRPr>
+                    </a:p>
+                  </a:txBody>
+                  <a:tcPr/>
+                </a:tc>
+                <a:tc>
+                  <a:txBody>
+                    <a:bodyPr/>
+                    <a:lstStyle/>
+                    <a:p>
+                      <a:pPr algn="ctr"/>
+                      <a:endParaRPr lang="en-US" sz="1400" dirty="0" smtClean="0">
+                        <a:latin typeface="Arial"/>
+                        <a:cs typeface="Arial"/>
+                      </a:endParaRPr>
+                    </a:p>
+                  </a:txBody>
+                  <a:tcPr/>
+                </a:tc>
+                <a:tc>
+                  <a:txBody>
+                    <a:bodyPr/>
+                    <a:lstStyle/>
+                    <a:p>
+                      <a:pPr algn="ctr"/>
+                      <a:endParaRPr lang="en-US" sz="1400" dirty="0" smtClean="0">
+                        <a:latin typeface="Arial"/>
+                        <a:cs typeface="Arial"/>
+                      </a:endParaRPr>
+                    </a:p>
+                  </a:txBody>
+                  <a:tcPr/>
+                </a:tc>
+              </a:tr>
+              <a:tr h="323850">
+                <a:tc>
+                  <a:txBody>
+                    <a:bodyPr/>
+                    <a:lstStyle/>
+                    <a:p>
+                      <a:pPr algn="ctr"/>
+                      <a:r>
+                        <a:rPr lang="en-US" sz="1400" dirty="0" smtClean="0">
+                          <a:latin typeface="Arial"/>
+                          <a:cs typeface="Arial"/>
+                        </a:rPr>
+                        <a:t>…</a:t>
+                      </a:r>
+                      <a:endParaRPr lang="en-US" sz="1400" dirty="0">
+                        <a:latin typeface="Arial"/>
+                        <a:cs typeface="Arial"/>
+                      </a:endParaRPr>
+                    </a:p>
+                  </a:txBody>
+                  <a:tcPr/>
+                </a:tc>
+                <a:tc>
+                  <a:txBody>
+                    <a:bodyPr/>
+                    <a:lstStyle/>
+                    <a:p>
+                      <a:pPr algn="ctr"/>
+                      <a:endParaRPr lang="en-US" sz="1400" dirty="0">
+                        <a:latin typeface="Arial"/>
+                        <a:cs typeface="Arial"/>
+                      </a:endParaRPr>
+                    </a:p>
+                  </a:txBody>
+                  <a:tcPr/>
+                </a:tc>
+                <a:tc>
+                  <a:txBody>
+                    <a:bodyPr/>
+                    <a:lstStyle/>
+                    <a:p>
+                      <a:pPr algn="ctr"/>
+                      <a:endParaRPr lang="en-US" sz="1400" dirty="0" smtClean="0">
+                        <a:latin typeface="Arial"/>
+                        <a:cs typeface="Arial"/>
+                      </a:endParaRPr>
+                    </a:p>
+                  </a:txBody>
+                  <a:tcPr/>
+                </a:tc>
+                <a:tc>
+                  <a:txBody>
+                    <a:bodyPr/>
+                    <a:lstStyle/>
+                    <a:p>
+                      <a:pPr algn="ctr"/>
+                      <a:endParaRPr lang="en-US" sz="1400" dirty="0" smtClean="0">
+                        <a:latin typeface="Arial"/>
+                        <a:cs typeface="Arial"/>
+                      </a:endParaRPr>
+                    </a:p>
+                  </a:txBody>
+                  <a:tcPr/>
+                </a:tc>
+              </a:tr>
+            </a:tbl>
+          </a:graphicData>
+        </a:graphic>
+      </p:graphicFrame>
+    </p:spTree>
+  </p:cSld>
+  <p:clrMapOvr>
+    <a:masterClrMapping/>
+  </p:clrMapOvr>
+  <p:timing>
+    <p:tnLst>
+      <p:par>
+        <p:cTn id="1" dur="indefinite" restart="never" nodeType="tmRoot"/>
+      </p:par>
+    </p:tnLst>
+  </p:timing>
+</p:sld>
+</file>
+
+<file path=ppt/slides/slide9.xml><?xml version="1.0" encoding="utf-8"?>
 <p:sld xmlns:a="http://schemas.openxmlformats.org/drawingml/2006/main" xmlns:r="http://schemas.openxmlformats.org/officeDocument/2006/relationships" xmlns:mc="http://schemas.openxmlformats.org/markup-compatibility/2006" xmlns:mv="urn:schemas-microsoft-com:mac:vml" xmlns:p="http://schemas.openxmlformats.org/presentationml/2006/main" mc:Ignorable="mv" mc:PreserveAttributes="mv:*">
   <p:cSld>
     <p:spTree>

</xml_diff>